<commit_message>
Use template(3) token replacement and add season color picker
</commit_message>
<xml_diff>
--- a/template.pptx
+++ b/template.pptx
@@ -257,7 +257,7 @@
       </p15:sldGuideLst>
     </p:ext>
     <p:ext uri="GoogleSlidesCustomDataVersion2">
-      <go:slidesCustomData xmlns:go="http://customooxmlschemas.google.com/" r:id="rId7" roundtripDataSignature="AMtx7mhqIBll9ninnoyqkfhiVTDLBQGLfw=="/>
+      <go:slidesCustomData xmlns:go="http://customooxmlschemas.google.com/" r:id="rId7" roundtripDataSignature="AMtx7mjtTdh6vjQ7n6MHHoIMC+8wow7CeA=="/>
     </p:ext>
   </p:extLst>
 </p:presentation>
@@ -2185,6 +2185,165 @@
         <p:nvSpPr>
           <p:cNvPr id="17" name="Google Shape;17;p4"/>
           <p:cNvSpPr txBox="1"/>
+          <p:nvPr/>
+        </p:nvSpPr>
+        <p:spPr>
+          <a:xfrm>
+            <a:off x="249924" y="1100971"/>
+            <a:ext cx="4213800" cy="498600"/>
+          </a:xfrm>
+          <a:prstGeom prst="rect">
+            <a:avLst/>
+          </a:prstGeom>
+          <a:noFill/>
+          <a:ln>
+            <a:noFill/>
+          </a:ln>
+        </p:spPr>
+        <p:txBody>
+          <a:bodyPr anchorCtr="0" anchor="t" bIns="91425" lIns="91425" spcFirstLastPara="1" rIns="91425" wrap="square" tIns="91425">
+            <a:spAutoFit/>
+          </a:bodyPr>
+          <a:lstStyle/>
+          <a:p>
+            <a:pPr indent="0" lvl="0" marL="0" rtl="0" algn="l">
+              <a:lnSpc>
+                <a:spcPct val="85000"/>
+              </a:lnSpc>
+              <a:spcBef>
+                <a:spcPts val="0"/>
+              </a:spcBef>
+              <a:spcAft>
+                <a:spcPts val="0"/>
+              </a:spcAft>
+              <a:buNone/>
+            </a:pPr>
+            <a:r>
+              <a:rPr lang="en-US" sz="2400">
+                <a:solidFill>
+                  <a:schemeClr val="dk1"/>
+                </a:solidFill>
+              </a:rPr>
+              <a:t>{code}</a:t>
+            </a:r>
+            <a:endParaRPr sz="2400">
+              <a:solidFill>
+                <a:schemeClr val="accent2"/>
+              </a:solidFill>
+            </a:endParaRPr>
+          </a:p>
+        </p:txBody>
+      </p:sp>
+      <p:sp>
+        <p:nvSpPr>
+          <p:cNvPr id="18" name="Google Shape;18;p4"/>
+          <p:cNvSpPr txBox="1"/>
+          <p:nvPr/>
+        </p:nvSpPr>
+        <p:spPr>
+          <a:xfrm>
+            <a:off x="249924" y="788950"/>
+            <a:ext cx="4213800" cy="498600"/>
+          </a:xfrm>
+          <a:prstGeom prst="rect">
+            <a:avLst/>
+          </a:prstGeom>
+          <a:noFill/>
+          <a:ln>
+            <a:noFill/>
+          </a:ln>
+        </p:spPr>
+        <p:txBody>
+          <a:bodyPr anchorCtr="0" anchor="t" bIns="91425" lIns="91425" spcFirstLastPara="1" rIns="91425" wrap="square" tIns="91425">
+            <a:spAutoFit/>
+          </a:bodyPr>
+          <a:lstStyle/>
+          <a:p>
+            <a:pPr indent="0" lvl="0" marL="0" rtl="0" algn="l">
+              <a:lnSpc>
+                <a:spcPct val="85000"/>
+              </a:lnSpc>
+              <a:spcBef>
+                <a:spcPts val="0"/>
+              </a:spcBef>
+              <a:spcAft>
+                <a:spcPts val="0"/>
+              </a:spcAft>
+              <a:buNone/>
+            </a:pPr>
+            <a:r>
+              <a:rPr lang="en-US" sz="2400">
+                <a:solidFill>
+                  <a:schemeClr val="accent2"/>
+                </a:solidFill>
+              </a:rPr>
+              <a:t>{category}</a:t>
+            </a:r>
+            <a:endParaRPr sz="1200">
+              <a:solidFill>
+                <a:srgbClr val="00B0F0"/>
+              </a:solidFill>
+            </a:endParaRPr>
+          </a:p>
+        </p:txBody>
+      </p:sp>
+      <p:sp>
+        <p:nvSpPr>
+          <p:cNvPr id="19" name="Google Shape;19;p4"/>
+          <p:cNvSpPr txBox="1"/>
+          <p:nvPr/>
+        </p:nvSpPr>
+        <p:spPr>
+          <a:xfrm>
+            <a:off x="735392" y="368515"/>
+            <a:ext cx="3000000" cy="341700"/>
+          </a:xfrm>
+          <a:prstGeom prst="rect">
+            <a:avLst/>
+          </a:prstGeom>
+          <a:noFill/>
+          <a:ln>
+            <a:noFill/>
+          </a:ln>
+        </p:spPr>
+        <p:txBody>
+          <a:bodyPr anchorCtr="0" anchor="t" bIns="91425" lIns="91425" spcFirstLastPara="1" rIns="91425" wrap="square" tIns="91425">
+            <a:spAutoFit/>
+          </a:bodyPr>
+          <a:lstStyle/>
+          <a:p>
+            <a:pPr indent="0" lvl="0" marL="0" rtl="0" algn="l">
+              <a:lnSpc>
+                <a:spcPct val="85000"/>
+              </a:lnSpc>
+              <a:spcBef>
+                <a:spcPts val="0"/>
+              </a:spcBef>
+              <a:spcAft>
+                <a:spcPts val="0"/>
+              </a:spcAft>
+              <a:buNone/>
+            </a:pPr>
+            <a:r>
+              <a:rPr lang="en-US" sz="1200">
+                <a:solidFill>
+                  <a:srgbClr val="00B0F0"/>
+                </a:solidFill>
+              </a:rPr>
+              <a:t>{season}</a:t>
+            </a:r>
+            <a:endParaRPr sz="1200">
+              <a:solidFill>
+                <a:srgbClr val="00B0F0"/>
+              </a:solidFill>
+            </a:endParaRPr>
+          </a:p>
+        </p:txBody>
+      </p:sp>
+      <p:sp>
+        <p:nvSpPr>
+          <p:cNvPr id="20" name="Google Shape;20;p4"/>
+          <p:cNvSpPr txBox="1"/>
           <p:nvPr>
             <p:ph idx="12" type="sldNum"/>
           </p:nvPr>
@@ -2466,7 +2625,7 @@
       </p:sp>
       <p:sp>
         <p:nvSpPr>
-          <p:cNvPr id="18" name="Google Shape;18;p4"/>
+          <p:cNvPr id="21" name="Google Shape;21;p4"/>
           <p:cNvSpPr/>
           <p:nvPr/>
         </p:nvSpPr>
@@ -2529,7 +2688,7 @@
       </p:sp>
       <p:sp>
         <p:nvSpPr>
-          <p:cNvPr id="19" name="Google Shape;19;p4"/>
+          <p:cNvPr id="22" name="Google Shape;22;p4"/>
           <p:cNvSpPr txBox="1"/>
           <p:nvPr/>
         </p:nvSpPr>
@@ -2595,7 +2754,7 @@
       </p:sp>
       <p:sp>
         <p:nvSpPr>
-          <p:cNvPr id="20" name="Google Shape;20;p4"/>
+          <p:cNvPr id="23" name="Google Shape;23;p4"/>
           <p:cNvSpPr/>
           <p:nvPr/>
         </p:nvSpPr>
@@ -2660,7 +2819,7 @@
       </p:sp>
       <p:sp>
         <p:nvSpPr>
-          <p:cNvPr id="21" name="Google Shape;21;p4"/>
+          <p:cNvPr id="24" name="Google Shape;24;p4"/>
           <p:cNvSpPr/>
           <p:nvPr/>
         </p:nvSpPr>
@@ -2725,7 +2884,7 @@
       </p:sp>
       <p:sp>
         <p:nvSpPr>
-          <p:cNvPr id="22" name="Google Shape;22;p4"/>
+          <p:cNvPr id="25" name="Google Shape;25;p4"/>
           <p:cNvSpPr txBox="1"/>
           <p:nvPr/>
         </p:nvSpPr>
@@ -2791,7 +2950,7 @@
       </p:sp>
       <p:sp>
         <p:nvSpPr>
-          <p:cNvPr id="23" name="Google Shape;23;p4"/>
+          <p:cNvPr id="26" name="Google Shape;26;p4"/>
           <p:cNvSpPr txBox="1"/>
           <p:nvPr/>
         </p:nvSpPr>
@@ -2857,7 +3016,7 @@
       </p:sp>
       <p:sp>
         <p:nvSpPr>
-          <p:cNvPr id="24" name="Google Shape;24;p4"/>
+          <p:cNvPr id="27" name="Google Shape;27;p4"/>
           <p:cNvSpPr txBox="1"/>
           <p:nvPr/>
         </p:nvSpPr>
@@ -2923,7 +3082,7 @@
       </p:sp>
       <p:sp>
         <p:nvSpPr>
-          <p:cNvPr id="25" name="Google Shape;25;p4"/>
+          <p:cNvPr id="28" name="Google Shape;28;p4"/>
           <p:cNvSpPr txBox="1"/>
           <p:nvPr/>
         </p:nvSpPr>
@@ -2989,7 +3148,7 @@
       </p:sp>
       <p:sp>
         <p:nvSpPr>
-          <p:cNvPr id="26" name="Google Shape;26;p4"/>
+          <p:cNvPr id="29" name="Google Shape;29;p4"/>
           <p:cNvSpPr txBox="1"/>
           <p:nvPr/>
         </p:nvSpPr>
@@ -3055,7 +3214,7 @@
       </p:sp>
       <p:pic>
         <p:nvPicPr>
-          <p:cNvPr id="27" name="Google Shape;27;p4"/>
+          <p:cNvPr id="30" name="Google Shape;30;p4"/>
           <p:cNvPicPr preferRelativeResize="0"/>
           <p:nvPr/>
         </p:nvPicPr>
@@ -3080,170 +3239,6 @@
           </a:ln>
         </p:spPr>
       </p:pic>
-      <p:sp>
-        <p:nvSpPr>
-          <p:cNvPr id="28" name="Google Shape;28;p4"/>
-          <p:cNvSpPr txBox="1"/>
-          <p:nvPr/>
-        </p:nvSpPr>
-        <p:spPr>
-          <a:xfrm>
-            <a:off x="342900" y="876799"/>
-            <a:ext cx="8611500" cy="288300"/>
-          </a:xfrm>
-          <a:prstGeom prst="rect">
-            <a:avLst/>
-          </a:prstGeom>
-          <a:noFill/>
-          <a:ln>
-            <a:noFill/>
-          </a:ln>
-        </p:spPr>
-        <p:txBody>
-          <a:bodyPr anchorCtr="0" anchor="t" bIns="0" lIns="0" spcFirstLastPara="1" rIns="0" wrap="square" tIns="0">
-            <a:noAutofit/>
-          </a:bodyPr>
-          <a:lstStyle/>
-          <a:p>
-            <a:pPr indent="0" lvl="0" marL="0" rtl="0" algn="l">
-              <a:lnSpc>
-                <a:spcPct val="85000"/>
-              </a:lnSpc>
-              <a:spcBef>
-                <a:spcPts val="0"/>
-              </a:spcBef>
-              <a:spcAft>
-                <a:spcPts val="0"/>
-              </a:spcAft>
-              <a:buNone/>
-            </a:pPr>
-            <a:r>
-              <a:rPr lang="en-US" sz="2400">
-                <a:solidFill>
-                  <a:srgbClr val="987147"/>
-                </a:solidFill>
-              </a:rPr>
-              <a:t>{category}</a:t>
-            </a:r>
-            <a:endParaRPr sz="2400">
-              <a:solidFill>
-                <a:srgbClr val="987147"/>
-              </a:solidFill>
-            </a:endParaRPr>
-          </a:p>
-        </p:txBody>
-      </p:sp>
-      <p:sp>
-        <p:nvSpPr>
-          <p:cNvPr id="29" name="Google Shape;29;p4"/>
-          <p:cNvSpPr txBox="1"/>
-          <p:nvPr/>
-        </p:nvSpPr>
-        <p:spPr>
-          <a:xfrm>
-            <a:off x="343327" y="1196473"/>
-            <a:ext cx="8520000" cy="288000"/>
-          </a:xfrm>
-          <a:prstGeom prst="rect">
-            <a:avLst/>
-          </a:prstGeom>
-          <a:noFill/>
-          <a:ln>
-            <a:noFill/>
-          </a:ln>
-        </p:spPr>
-        <p:txBody>
-          <a:bodyPr anchorCtr="0" anchor="t" bIns="0" lIns="0" spcFirstLastPara="1" rIns="0" wrap="square" tIns="0">
-            <a:noAutofit/>
-          </a:bodyPr>
-          <a:lstStyle/>
-          <a:p>
-            <a:pPr indent="0" lvl="0" marL="0" rtl="0" algn="l">
-              <a:lnSpc>
-                <a:spcPct val="85000"/>
-              </a:lnSpc>
-              <a:spcBef>
-                <a:spcPts val="0"/>
-              </a:spcBef>
-              <a:spcAft>
-                <a:spcPts val="0"/>
-              </a:spcAft>
-              <a:buNone/>
-            </a:pPr>
-            <a:r>
-              <a:rPr lang="en-US" sz="2400"/>
-              <a:t>{code}</a:t>
-            </a:r>
-            <a:endParaRPr sz="2400">
-              <a:solidFill>
-                <a:srgbClr val="000000"/>
-              </a:solidFill>
-            </a:endParaRPr>
-          </a:p>
-        </p:txBody>
-      </p:sp>
-      <p:sp>
-        <p:nvSpPr>
-          <p:cNvPr id="30" name="Google Shape;30;p4"/>
-          <p:cNvSpPr txBox="1"/>
-          <p:nvPr/>
-        </p:nvSpPr>
-        <p:spPr>
-          <a:xfrm>
-            <a:off x="827584" y="460811"/>
-            <a:ext cx="2701200" cy="144000"/>
-          </a:xfrm>
-          <a:prstGeom prst="rect">
-            <a:avLst/>
-          </a:prstGeom>
-          <a:noFill/>
-          <a:ln>
-            <a:noFill/>
-          </a:ln>
-        </p:spPr>
-        <p:txBody>
-          <a:bodyPr anchorCtr="0" anchor="t" bIns="0" lIns="0" spcFirstLastPara="1" rIns="0" wrap="square" tIns="0">
-            <a:noAutofit/>
-          </a:bodyPr>
-          <a:lstStyle/>
-          <a:p>
-            <a:pPr indent="0" lvl="0" marL="0" marR="0" rtl="0" algn="l">
-              <a:lnSpc>
-                <a:spcPct val="85000"/>
-              </a:lnSpc>
-              <a:spcBef>
-                <a:spcPts val="0"/>
-              </a:spcBef>
-              <a:spcAft>
-                <a:spcPts val="0"/>
-              </a:spcAft>
-              <a:buClr>
-                <a:srgbClr val="00B0F0"/>
-              </a:buClr>
-              <a:buSzPts val="1200"/>
-              <a:buFont typeface="Arial"/>
-              <a:buNone/>
-            </a:pPr>
-            <a:r>
-              <a:rPr lang="en-US" sz="1200">
-                <a:solidFill>
-                  <a:srgbClr val="00B0F0"/>
-                </a:solidFill>
-              </a:rPr>
-              <a:t>{season}</a:t>
-            </a:r>
-            <a:endParaRPr sz="1200" cap="none">
-              <a:solidFill>
-                <a:srgbClr val="00B0F0"/>
-              </a:solidFill>
-              <a:latin typeface="Arial"/>
-              <a:ea typeface="Arial"/>
-              <a:cs typeface="Arial"/>
-              <a:sym typeface="Arial"/>
-            </a:endParaRPr>
-          </a:p>
-        </p:txBody>
-      </p:sp>
       <p:sp>
         <p:nvSpPr>
           <p:cNvPr id="31" name="Google Shape;31;p4"/>
@@ -4575,6 +4570,285 @@
 </file>
 
 <file path=ppt/theme/theme1.xml><?xml version="1.0" encoding="utf-8"?>
+<a:theme xmlns:a="http://schemas.openxmlformats.org/drawingml/2006/main" xmlns:r="http://schemas.openxmlformats.org/officeDocument/2006/relationships" name="Template">
+  <a:themeElements>
+    <a:clrScheme name="Hugo Boss">
+      <a:dk1>
+        <a:srgbClr val="000000"/>
+      </a:dk1>
+      <a:lt1>
+        <a:srgbClr val="FFFFFF"/>
+      </a:lt1>
+      <a:dk2>
+        <a:srgbClr val="4B4B4B"/>
+      </a:dk2>
+      <a:lt2>
+        <a:srgbClr val="B9B9B9"/>
+      </a:lt2>
+      <a:accent1>
+        <a:srgbClr val="000000"/>
+      </a:accent1>
+      <a:accent2>
+        <a:srgbClr val="987147"/>
+      </a:accent2>
+      <a:accent3>
+        <a:srgbClr val="EDEDED"/>
+      </a:accent3>
+      <a:accent4>
+        <a:srgbClr val="4A4A4A"/>
+      </a:accent4>
+      <a:accent5>
+        <a:srgbClr val="929292"/>
+      </a:accent5>
+      <a:accent6>
+        <a:srgbClr val="D0D0D0"/>
+      </a:accent6>
+      <a:hlink>
+        <a:srgbClr val="000000"/>
+      </a:hlink>
+      <a:folHlink>
+        <a:srgbClr val="000000"/>
+      </a:folHlink>
+    </a:clrScheme>
+    <a:fontScheme name="Office">
+      <a:majorFont>
+        <a:latin typeface="Arial"/>
+        <a:ea typeface=""/>
+        <a:cs typeface=""/>
+        <a:font script="Jpan" typeface="ＭＳ Ｐゴシック"/>
+        <a:font script="Hang" typeface="맑은 고딕"/>
+        <a:font script="Hans" typeface="宋体"/>
+        <a:font script="Hant" typeface="新細明體"/>
+        <a:font script="Arab" typeface="Times New Roman"/>
+        <a:font script="Hebr" typeface="Times New Roman"/>
+        <a:font script="Thai" typeface="Angsana New"/>
+        <a:font script="Ethi" typeface="Nyala"/>
+        <a:font script="Beng" typeface="Vrinda"/>
+        <a:font script="Gujr" typeface="Shruti"/>
+        <a:font script="Khmr" typeface="MoolBoran"/>
+        <a:font script="Knda" typeface="Tunga"/>
+        <a:font script="Guru" typeface="Raavi"/>
+        <a:font script="Cans" typeface="Euphemia"/>
+        <a:font script="Cher" typeface="Plantagenet Cherokee"/>
+        <a:font script="Yiii" typeface="Microsoft Yi Baiti"/>
+        <a:font script="Tibt" typeface="Microsoft Himalaya"/>
+        <a:font script="Thaa" typeface="MV Boli"/>
+        <a:font script="Deva" typeface="Mangal"/>
+        <a:font script="Telu" typeface="Gautami"/>
+        <a:font script="Taml" typeface="Latha"/>
+        <a:font script="Syrc" typeface="Estrangelo Edessa"/>
+        <a:font script="Orya" typeface="Kalinga"/>
+        <a:font script="Mlym" typeface="Kartika"/>
+        <a:font script="Laoo" typeface="DokChampa"/>
+        <a:font script="Sinh" typeface="Iskoola Pota"/>
+        <a:font script="Mong" typeface="Mongolian Baiti"/>
+        <a:font script="Viet" typeface="Times New Roman"/>
+        <a:font script="Uigh" typeface="Microsoft Uighur"/>
+        <a:font script="Geor" typeface="Sylfaen"/>
+      </a:majorFont>
+      <a:minorFont>
+        <a:latin typeface="Arial"/>
+        <a:ea typeface=""/>
+        <a:cs typeface=""/>
+        <a:font script="Jpan" typeface="ＭＳ Ｐゴシック"/>
+        <a:font script="Hang" typeface="맑은 고딕"/>
+        <a:font script="Hans" typeface="宋体"/>
+        <a:font script="Hant" typeface="新細明體"/>
+        <a:font script="Arab" typeface="Arial"/>
+        <a:font script="Hebr" typeface="Arial"/>
+        <a:font script="Thai" typeface="Cordia New"/>
+        <a:font script="Ethi" typeface="Nyala"/>
+        <a:font script="Beng" typeface="Vrinda"/>
+        <a:font script="Gujr" typeface="Shruti"/>
+        <a:font script="Khmr" typeface="DaunPenh"/>
+        <a:font script="Knda" typeface="Tunga"/>
+        <a:font script="Guru" typeface="Raavi"/>
+        <a:font script="Cans" typeface="Euphemia"/>
+        <a:font script="Cher" typeface="Plantagenet Cherokee"/>
+        <a:font script="Yiii" typeface="Microsoft Yi Baiti"/>
+        <a:font script="Tibt" typeface="Microsoft Himalaya"/>
+        <a:font script="Thaa" typeface="MV Boli"/>
+        <a:font script="Deva" typeface="Mangal"/>
+        <a:font script="Telu" typeface="Gautami"/>
+        <a:font script="Taml" typeface="Latha"/>
+        <a:font script="Syrc" typeface="Estrangelo Edessa"/>
+        <a:font script="Orya" typeface="Kalinga"/>
+        <a:font script="Mlym" typeface="Kartika"/>
+        <a:font script="Laoo" typeface="DokChampa"/>
+        <a:font script="Sinh" typeface="Iskoola Pota"/>
+        <a:font script="Mong" typeface="Mongolian Baiti"/>
+        <a:font script="Viet" typeface="Arial"/>
+        <a:font script="Uigh" typeface="Microsoft Uighur"/>
+        <a:font script="Geor" typeface="Sylfaen"/>
+      </a:minorFont>
+    </a:fontScheme>
+    <a:fmtScheme name="Office">
+      <a:fillStyleLst>
+        <a:solidFill>
+          <a:schemeClr val="phClr"/>
+        </a:solidFill>
+        <a:gradFill rotWithShape="1">
+          <a:gsLst>
+            <a:gs pos="0">
+              <a:schemeClr val="phClr">
+                <a:tint val="50000"/>
+                <a:satMod val="300000"/>
+              </a:schemeClr>
+            </a:gs>
+            <a:gs pos="35000">
+              <a:schemeClr val="phClr">
+                <a:tint val="37000"/>
+                <a:satMod val="300000"/>
+              </a:schemeClr>
+            </a:gs>
+            <a:gs pos="100000">
+              <a:schemeClr val="phClr">
+                <a:tint val="15000"/>
+                <a:satMod val="350000"/>
+              </a:schemeClr>
+            </a:gs>
+          </a:gsLst>
+          <a:lin ang="16200000" scaled="1"/>
+        </a:gradFill>
+        <a:gradFill rotWithShape="1">
+          <a:gsLst>
+            <a:gs pos="0">
+              <a:schemeClr val="phClr">
+                <a:tint val="100000"/>
+                <a:shade val="100000"/>
+                <a:satMod val="130000"/>
+              </a:schemeClr>
+            </a:gs>
+            <a:gs pos="100000">
+              <a:schemeClr val="phClr">
+                <a:tint val="50000"/>
+                <a:shade val="100000"/>
+                <a:satMod val="350000"/>
+              </a:schemeClr>
+            </a:gs>
+          </a:gsLst>
+          <a:lin ang="16200000" scaled="0"/>
+        </a:gradFill>
+      </a:fillStyleLst>
+      <a:lnStyleLst>
+        <a:ln w="9525" cap="flat" cmpd="sng" algn="ctr">
+          <a:solidFill>
+            <a:schemeClr val="phClr">
+              <a:shade val="95000"/>
+              <a:satMod val="105000"/>
+            </a:schemeClr>
+          </a:solidFill>
+          <a:prstDash val="solid"/>
+        </a:ln>
+        <a:ln w="25400" cap="flat" cmpd="sng" algn="ctr">
+          <a:solidFill>
+            <a:schemeClr val="phClr"/>
+          </a:solidFill>
+          <a:prstDash val="solid"/>
+        </a:ln>
+        <a:ln w="38100" cap="flat" cmpd="sng" algn="ctr">
+          <a:solidFill>
+            <a:schemeClr val="phClr"/>
+          </a:solidFill>
+          <a:prstDash val="solid"/>
+        </a:ln>
+      </a:lnStyleLst>
+      <a:effectStyleLst>
+        <a:effectStyle>
+          <a:effectLst>
+            <a:outerShdw blurRad="40000" dist="20000" dir="5400000" rotWithShape="0">
+              <a:srgbClr val="000000">
+                <a:alpha val="38000"/>
+              </a:srgbClr>
+            </a:outerShdw>
+          </a:effectLst>
+        </a:effectStyle>
+        <a:effectStyle>
+          <a:effectLst>
+            <a:outerShdw blurRad="40000" dist="23000" dir="5400000" rotWithShape="0">
+              <a:srgbClr val="000000">
+                <a:alpha val="35000"/>
+              </a:srgbClr>
+            </a:outerShdw>
+          </a:effectLst>
+        </a:effectStyle>
+        <a:effectStyle>
+          <a:effectLst>
+            <a:outerShdw blurRad="40000" dist="23000" dir="5400000" rotWithShape="0">
+              <a:srgbClr val="000000">
+                <a:alpha val="35000"/>
+              </a:srgbClr>
+            </a:outerShdw>
+          </a:effectLst>
+          <a:scene3d>
+            <a:camera prst="orthographicFront">
+              <a:rot lat="0" lon="0" rev="0"/>
+            </a:camera>
+            <a:lightRig rig="threePt" dir="t">
+              <a:rot lat="0" lon="0" rev="1200000"/>
+            </a:lightRig>
+          </a:scene3d>
+          <a:sp3d>
+            <a:bevelT w="63500" h="25400"/>
+          </a:sp3d>
+        </a:effectStyle>
+      </a:effectStyleLst>
+      <a:bgFillStyleLst>
+        <a:solidFill>
+          <a:schemeClr val="phClr"/>
+        </a:solidFill>
+        <a:gradFill rotWithShape="1">
+          <a:gsLst>
+            <a:gs pos="0">
+              <a:schemeClr val="phClr">
+                <a:tint val="40000"/>
+                <a:satMod val="350000"/>
+              </a:schemeClr>
+            </a:gs>
+            <a:gs pos="40000">
+              <a:schemeClr val="phClr">
+                <a:tint val="45000"/>
+                <a:shade val="99000"/>
+                <a:satMod val="350000"/>
+              </a:schemeClr>
+            </a:gs>
+            <a:gs pos="100000">
+              <a:schemeClr val="phClr">
+                <a:shade val="20000"/>
+                <a:satMod val="255000"/>
+              </a:schemeClr>
+            </a:gs>
+          </a:gsLst>
+          <a:path path="circle">
+            <a:fillToRect l="50000" t="-80000" r="50000" b="180000"/>
+          </a:path>
+        </a:gradFill>
+        <a:gradFill rotWithShape="1">
+          <a:gsLst>
+            <a:gs pos="0">
+              <a:schemeClr val="phClr">
+                <a:tint val="80000"/>
+                <a:satMod val="300000"/>
+              </a:schemeClr>
+            </a:gs>
+            <a:gs pos="100000">
+              <a:schemeClr val="phClr">
+                <a:shade val="30000"/>
+                <a:satMod val="200000"/>
+              </a:schemeClr>
+            </a:gs>
+          </a:gsLst>
+          <a:path path="circle">
+            <a:fillToRect l="50000" t="50000" r="50000" b="50000"/>
+          </a:path>
+        </a:gradFill>
+      </a:bgFillStyleLst>
+    </a:fmtScheme>
+  </a:themeElements>
+</a:theme>
+</file>
+
+<file path=ppt/theme/theme2.xml><?xml version="1.0" encoding="utf-8"?>
 <a:theme xmlns:a="http://schemas.openxmlformats.org/drawingml/2006/main" xmlns:r="http://schemas.openxmlformats.org/officeDocument/2006/relationships" name="Office Theme">
   <a:themeElements>
     <a:clrScheme name="Hugo Boss">
@@ -4851,283 +5125,4 @@
     </a:fmtScheme>
   </a:themeElements>
 </a:theme>
-</file>
-
-<file path=ppt/theme/theme2.xml><?xml version="1.0" encoding="utf-8"?>
-<a:theme xmlns:a="http://schemas.openxmlformats.org/drawingml/2006/main" xmlns:r="http://schemas.openxmlformats.org/officeDocument/2006/relationships" name="Template">
-  <a:themeElements>
-    <a:clrScheme name="Hugo Boss">
-      <a:dk1>
-        <a:srgbClr val="000000"/>
-      </a:dk1>
-      <a:lt1>
-        <a:srgbClr val="FFFFFF"/>
-      </a:lt1>
-      <a:dk2>
-        <a:srgbClr val="4B4B4B"/>
-      </a:dk2>
-      <a:lt2>
-        <a:srgbClr val="B9B9B9"/>
-      </a:lt2>
-      <a:accent1>
-        <a:srgbClr val="000000"/>
-      </a:accent1>
-      <a:accent2>
-        <a:srgbClr val="987147"/>
-      </a:accent2>
-      <a:accent3>
-        <a:srgbClr val="EDEDED"/>
-      </a:accent3>
-      <a:accent4>
-        <a:srgbClr val="4A4A4A"/>
-      </a:accent4>
-      <a:accent5>
-        <a:srgbClr val="929292"/>
-      </a:accent5>
-      <a:accent6>
-        <a:srgbClr val="D0D0D0"/>
-      </a:accent6>
-      <a:hlink>
-        <a:srgbClr val="000000"/>
-      </a:hlink>
-      <a:folHlink>
-        <a:srgbClr val="000000"/>
-      </a:folHlink>
-    </a:clrScheme>
-    <a:fontScheme name="Office">
-      <a:majorFont>
-        <a:latin typeface="Arial"/>
-        <a:ea typeface=""/>
-        <a:cs typeface=""/>
-        <a:font script="Jpan" typeface="ＭＳ Ｐゴシック"/>
-        <a:font script="Hang" typeface="맑은 고딕"/>
-        <a:font script="Hans" typeface="宋体"/>
-        <a:font script="Hant" typeface="新細明體"/>
-        <a:font script="Arab" typeface="Times New Roman"/>
-        <a:font script="Hebr" typeface="Times New Roman"/>
-        <a:font script="Thai" typeface="Angsana New"/>
-        <a:font script="Ethi" typeface="Nyala"/>
-        <a:font script="Beng" typeface="Vrinda"/>
-        <a:font script="Gujr" typeface="Shruti"/>
-        <a:font script="Khmr" typeface="MoolBoran"/>
-        <a:font script="Knda" typeface="Tunga"/>
-        <a:font script="Guru" typeface="Raavi"/>
-        <a:font script="Cans" typeface="Euphemia"/>
-        <a:font script="Cher" typeface="Plantagenet Cherokee"/>
-        <a:font script="Yiii" typeface="Microsoft Yi Baiti"/>
-        <a:font script="Tibt" typeface="Microsoft Himalaya"/>
-        <a:font script="Thaa" typeface="MV Boli"/>
-        <a:font script="Deva" typeface="Mangal"/>
-        <a:font script="Telu" typeface="Gautami"/>
-        <a:font script="Taml" typeface="Latha"/>
-        <a:font script="Syrc" typeface="Estrangelo Edessa"/>
-        <a:font script="Orya" typeface="Kalinga"/>
-        <a:font script="Mlym" typeface="Kartika"/>
-        <a:font script="Laoo" typeface="DokChampa"/>
-        <a:font script="Sinh" typeface="Iskoola Pota"/>
-        <a:font script="Mong" typeface="Mongolian Baiti"/>
-        <a:font script="Viet" typeface="Times New Roman"/>
-        <a:font script="Uigh" typeface="Microsoft Uighur"/>
-        <a:font script="Geor" typeface="Sylfaen"/>
-      </a:majorFont>
-      <a:minorFont>
-        <a:latin typeface="Arial"/>
-        <a:ea typeface=""/>
-        <a:cs typeface=""/>
-        <a:font script="Jpan" typeface="ＭＳ Ｐゴシック"/>
-        <a:font script="Hang" typeface="맑은 고딕"/>
-        <a:font script="Hans" typeface="宋体"/>
-        <a:font script="Hant" typeface="新細明體"/>
-        <a:font script="Arab" typeface="Arial"/>
-        <a:font script="Hebr" typeface="Arial"/>
-        <a:font script="Thai" typeface="Cordia New"/>
-        <a:font script="Ethi" typeface="Nyala"/>
-        <a:font script="Beng" typeface="Vrinda"/>
-        <a:font script="Gujr" typeface="Shruti"/>
-        <a:font script="Khmr" typeface="DaunPenh"/>
-        <a:font script="Knda" typeface="Tunga"/>
-        <a:font script="Guru" typeface="Raavi"/>
-        <a:font script="Cans" typeface="Euphemia"/>
-        <a:font script="Cher" typeface="Plantagenet Cherokee"/>
-        <a:font script="Yiii" typeface="Microsoft Yi Baiti"/>
-        <a:font script="Tibt" typeface="Microsoft Himalaya"/>
-        <a:font script="Thaa" typeface="MV Boli"/>
-        <a:font script="Deva" typeface="Mangal"/>
-        <a:font script="Telu" typeface="Gautami"/>
-        <a:font script="Taml" typeface="Latha"/>
-        <a:font script="Syrc" typeface="Estrangelo Edessa"/>
-        <a:font script="Orya" typeface="Kalinga"/>
-        <a:font script="Mlym" typeface="Kartika"/>
-        <a:font script="Laoo" typeface="DokChampa"/>
-        <a:font script="Sinh" typeface="Iskoola Pota"/>
-        <a:font script="Mong" typeface="Mongolian Baiti"/>
-        <a:font script="Viet" typeface="Arial"/>
-        <a:font script="Uigh" typeface="Microsoft Uighur"/>
-        <a:font script="Geor" typeface="Sylfaen"/>
-      </a:minorFont>
-    </a:fontScheme>
-    <a:fmtScheme name="Office">
-      <a:fillStyleLst>
-        <a:solidFill>
-          <a:schemeClr val="phClr"/>
-        </a:solidFill>
-        <a:gradFill rotWithShape="1">
-          <a:gsLst>
-            <a:gs pos="0">
-              <a:schemeClr val="phClr">
-                <a:tint val="50000"/>
-                <a:satMod val="300000"/>
-              </a:schemeClr>
-            </a:gs>
-            <a:gs pos="35000">
-              <a:schemeClr val="phClr">
-                <a:tint val="37000"/>
-                <a:satMod val="300000"/>
-              </a:schemeClr>
-            </a:gs>
-            <a:gs pos="100000">
-              <a:schemeClr val="phClr">
-                <a:tint val="15000"/>
-                <a:satMod val="350000"/>
-              </a:schemeClr>
-            </a:gs>
-          </a:gsLst>
-          <a:lin ang="16200000" scaled="1"/>
-        </a:gradFill>
-        <a:gradFill rotWithShape="1">
-          <a:gsLst>
-            <a:gs pos="0">
-              <a:schemeClr val="phClr">
-                <a:tint val="100000"/>
-                <a:shade val="100000"/>
-                <a:satMod val="130000"/>
-              </a:schemeClr>
-            </a:gs>
-            <a:gs pos="100000">
-              <a:schemeClr val="phClr">
-                <a:tint val="50000"/>
-                <a:shade val="100000"/>
-                <a:satMod val="350000"/>
-              </a:schemeClr>
-            </a:gs>
-          </a:gsLst>
-          <a:lin ang="16200000" scaled="0"/>
-        </a:gradFill>
-      </a:fillStyleLst>
-      <a:lnStyleLst>
-        <a:ln w="9525" cap="flat" cmpd="sng" algn="ctr">
-          <a:solidFill>
-            <a:schemeClr val="phClr">
-              <a:shade val="95000"/>
-              <a:satMod val="105000"/>
-            </a:schemeClr>
-          </a:solidFill>
-          <a:prstDash val="solid"/>
-        </a:ln>
-        <a:ln w="25400" cap="flat" cmpd="sng" algn="ctr">
-          <a:solidFill>
-            <a:schemeClr val="phClr"/>
-          </a:solidFill>
-          <a:prstDash val="solid"/>
-        </a:ln>
-        <a:ln w="38100" cap="flat" cmpd="sng" algn="ctr">
-          <a:solidFill>
-            <a:schemeClr val="phClr"/>
-          </a:solidFill>
-          <a:prstDash val="solid"/>
-        </a:ln>
-      </a:lnStyleLst>
-      <a:effectStyleLst>
-        <a:effectStyle>
-          <a:effectLst>
-            <a:outerShdw blurRad="40000" dist="20000" dir="5400000" rotWithShape="0">
-              <a:srgbClr val="000000">
-                <a:alpha val="38000"/>
-              </a:srgbClr>
-            </a:outerShdw>
-          </a:effectLst>
-        </a:effectStyle>
-        <a:effectStyle>
-          <a:effectLst>
-            <a:outerShdw blurRad="40000" dist="23000" dir="5400000" rotWithShape="0">
-              <a:srgbClr val="000000">
-                <a:alpha val="35000"/>
-              </a:srgbClr>
-            </a:outerShdw>
-          </a:effectLst>
-        </a:effectStyle>
-        <a:effectStyle>
-          <a:effectLst>
-            <a:outerShdw blurRad="40000" dist="23000" dir="5400000" rotWithShape="0">
-              <a:srgbClr val="000000">
-                <a:alpha val="35000"/>
-              </a:srgbClr>
-            </a:outerShdw>
-          </a:effectLst>
-          <a:scene3d>
-            <a:camera prst="orthographicFront">
-              <a:rot lat="0" lon="0" rev="0"/>
-            </a:camera>
-            <a:lightRig rig="threePt" dir="t">
-              <a:rot lat="0" lon="0" rev="1200000"/>
-            </a:lightRig>
-          </a:scene3d>
-          <a:sp3d>
-            <a:bevelT w="63500" h="25400"/>
-          </a:sp3d>
-        </a:effectStyle>
-      </a:effectStyleLst>
-      <a:bgFillStyleLst>
-        <a:solidFill>
-          <a:schemeClr val="phClr"/>
-        </a:solidFill>
-        <a:gradFill rotWithShape="1">
-          <a:gsLst>
-            <a:gs pos="0">
-              <a:schemeClr val="phClr">
-                <a:tint val="40000"/>
-                <a:satMod val="350000"/>
-              </a:schemeClr>
-            </a:gs>
-            <a:gs pos="40000">
-              <a:schemeClr val="phClr">
-                <a:tint val="45000"/>
-                <a:shade val="99000"/>
-                <a:satMod val="350000"/>
-              </a:schemeClr>
-            </a:gs>
-            <a:gs pos="100000">
-              <a:schemeClr val="phClr">
-                <a:shade val="20000"/>
-                <a:satMod val="255000"/>
-              </a:schemeClr>
-            </a:gs>
-          </a:gsLst>
-          <a:path path="circle">
-            <a:fillToRect l="50000" t="-80000" r="50000" b="180000"/>
-          </a:path>
-        </a:gradFill>
-        <a:gradFill rotWithShape="1">
-          <a:gsLst>
-            <a:gs pos="0">
-              <a:schemeClr val="phClr">
-                <a:tint val="80000"/>
-                <a:satMod val="300000"/>
-              </a:schemeClr>
-            </a:gs>
-            <a:gs pos="100000">
-              <a:schemeClr val="phClr">
-                <a:shade val="30000"/>
-                <a:satMod val="200000"/>
-              </a:schemeClr>
-            </a:gs>
-          </a:gsLst>
-          <a:path path="circle">
-            <a:fillToRect l="50000" t="50000" r="50000" b="50000"/>
-          </a:path>
-        </a:gradFill>
-      </a:bgFillStyleLst>
-    </a:fmtScheme>
-  </a:themeElements>
-</a:theme>
 </file>
</xml_diff>

<commit_message>
Set master label fonts to Averta Light
</commit_message>
<xml_diff>
--- a/template.pptx
+++ b/template.pptx
@@ -2165,7 +2165,7 @@
 </file>
 
 <file path=ppt/slideLayouts/slideLayout2.xml><?xml version="1.0" encoding="utf-8"?>
-<p:sldLayout xmlns:a="http://schemas.openxmlformats.org/drawingml/2006/main" xmlns:r="http://schemas.openxmlformats.org/officeDocument/2006/relationships" xmlns:mc="http://schemas.openxmlformats.org/markup-compatibility/2006" xmlns:mv="urn:schemas-microsoft-com:mac:vml" xmlns:p="http://schemas.openxmlformats.org/presentationml/2006/main" xmlns:c="http://schemas.openxmlformats.org/drawingml/2006/chart" xmlns:dgm="http://schemas.openxmlformats.org/drawingml/2006/diagram" xmlns:o="urn:schemas-microsoft-com:office:office" xmlns:v="urn:schemas-microsoft-com:vml" xmlns:pvml="urn:schemas-microsoft-com:office:powerpoint" xmlns:com="http://schemas.openxmlformats.org/drawingml/2006/compatibility" xmlns:p14="http://schemas.microsoft.com/office/powerpoint/2010/main" xmlns:p15="http://schemas.microsoft.com/office/powerpoint/2012/main" xmlns:ahyp="http://schemas.microsoft.com/office/drawing/2018/hyperlinkcolor" matchingName="default">
+<p:sldLayout xmlns:a="http://schemas.openxmlformats.org/drawingml/2006/main" xmlns:ns2="http://schemas.openxmlformats.org/officeDocument/2006/relationships" xmlns:p="http://schemas.openxmlformats.org/presentationml/2006/main" matchingName="default">
   <p:cSld name="HB Title / Content">
     <p:spTree>
       <p:nvGrpSpPr>
@@ -2733,9 +2733,9 @@
                 <a:solidFill>
                   <a:schemeClr val="accent2"/>
                 </a:solidFill>
-                <a:latin typeface="Arial"/>
-                <a:ea typeface="Arial"/>
-                <a:cs typeface="Arial"/>
+                <a:latin typeface="Averta Light"/>
+                <a:ea typeface="Averta Light"/>
+                <a:cs typeface="Averta Light"/>
                 <a:sym typeface="Arial"/>
               </a:rPr>
               <a:t>APPROVAL CONFIRM</a:t>
@@ -2744,9 +2744,9 @@
               <a:solidFill>
                 <a:schemeClr val="accent2"/>
               </a:solidFill>
-              <a:latin typeface="Arial"/>
-              <a:ea typeface="Arial"/>
-              <a:cs typeface="Arial"/>
+              <a:latin typeface="Averta Light"/>
+              <a:ea typeface="Averta Light"/>
+              <a:cs typeface="Averta Light"/>
               <a:sym typeface="Arial"/>
             </a:endParaRPr>
           </a:p>
@@ -2929,9 +2929,9 @@
                 <a:solidFill>
                   <a:schemeClr val="dk1"/>
                 </a:solidFill>
-                <a:latin typeface="Arial"/>
-                <a:ea typeface="Arial"/>
-                <a:cs typeface="Arial"/>
+                <a:latin typeface="Averta Light"/>
+                <a:ea typeface="Averta Light"/>
+                <a:cs typeface="Averta Light"/>
                 <a:sym typeface="Arial"/>
               </a:rPr>
               <a:t>LOGO</a:t>
@@ -2940,9 +2940,9 @@
               <a:solidFill>
                 <a:schemeClr val="dk1"/>
               </a:solidFill>
-              <a:latin typeface="Arial"/>
-              <a:ea typeface="Arial"/>
-              <a:cs typeface="Arial"/>
+              <a:latin typeface="Averta Light"/>
+              <a:ea typeface="Averta Light"/>
+              <a:cs typeface="Averta Light"/>
               <a:sym typeface="Arial"/>
             </a:endParaRPr>
           </a:p>
@@ -2995,9 +2995,9 @@
                 <a:solidFill>
                   <a:schemeClr val="dk1"/>
                 </a:solidFill>
-                <a:latin typeface="Arial"/>
-                <a:ea typeface="Arial"/>
-                <a:cs typeface="Arial"/>
+                <a:latin typeface="Averta Light"/>
+                <a:ea typeface="Averta Light"/>
+                <a:cs typeface="Averta Light"/>
                 <a:sym typeface="Arial"/>
               </a:rPr>
               <a:t>ARTWORK</a:t>
@@ -3006,9 +3006,9 @@
               <a:solidFill>
                 <a:schemeClr val="dk1"/>
               </a:solidFill>
-              <a:latin typeface="Arial"/>
-              <a:ea typeface="Arial"/>
-              <a:cs typeface="Arial"/>
+              <a:latin typeface="Averta Light"/>
+              <a:ea typeface="Averta Light"/>
+              <a:cs typeface="Averta Light"/>
               <a:sym typeface="Arial"/>
             </a:endParaRPr>
           </a:p>
@@ -3061,9 +3061,9 @@
                 <a:solidFill>
                   <a:schemeClr val="dk1"/>
                 </a:solidFill>
-                <a:latin typeface="Arial"/>
-                <a:ea typeface="Arial"/>
-                <a:cs typeface="Arial"/>
+                <a:latin typeface="Averta Light"/>
+                <a:ea typeface="Averta Light"/>
+                <a:cs typeface="Averta Light"/>
                 <a:sym typeface="Arial"/>
               </a:rPr>
               <a:t> RRP : Undecided</a:t>
@@ -3072,9 +3072,9 @@
               <a:solidFill>
                 <a:schemeClr val="dk1"/>
               </a:solidFill>
-              <a:latin typeface="Arial"/>
-              <a:ea typeface="Arial"/>
-              <a:cs typeface="Arial"/>
+              <a:latin typeface="Averta Light"/>
+              <a:ea typeface="Averta Light"/>
+              <a:cs typeface="Averta Light"/>
               <a:sym typeface="Arial"/>
             </a:endParaRPr>
           </a:p>
@@ -3127,9 +3127,9 @@
                 <a:solidFill>
                   <a:schemeClr val="dk1"/>
                 </a:solidFill>
-                <a:latin typeface="Arial"/>
-                <a:ea typeface="Arial"/>
-                <a:cs typeface="Arial"/>
+                <a:latin typeface="Averta Light"/>
+                <a:ea typeface="Averta Light"/>
+                <a:cs typeface="Averta Light"/>
                 <a:sym typeface="Arial"/>
               </a:rPr>
               <a:t>Colorway </a:t>
@@ -3138,9 +3138,9 @@
               <a:solidFill>
                 <a:schemeClr val="dk1"/>
               </a:solidFill>
-              <a:latin typeface="Arial"/>
-              <a:ea typeface="Arial"/>
-              <a:cs typeface="Arial"/>
+              <a:latin typeface="Averta Light"/>
+              <a:ea typeface="Averta Light"/>
+              <a:cs typeface="Averta Light"/>
               <a:sym typeface="Arial"/>
             </a:endParaRPr>
           </a:p>
@@ -3219,7 +3219,7 @@
           <p:nvPr/>
         </p:nvPicPr>
         <p:blipFill rotWithShape="1">
-          <a:blip r:embed="rId2">
+          <a:blip ns2:embed="rId2">
             <a:alphaModFix/>
           </a:blip>
           <a:srcRect b="0" l="0" r="0" t="0"/>

</xml_diff>

<commit_message>
Switch to GitHub-backed assets and include latest app/template updates
</commit_message>
<xml_diff>
--- a/template.pptx
+++ b/template.pptx
@@ -257,7 +257,7 @@
       </p15:sldGuideLst>
     </p:ext>
     <p:ext uri="GoogleSlidesCustomDataVersion2">
-      <go:slidesCustomData xmlns:go="http://customooxmlschemas.google.com/" r:id="rId7" roundtripDataSignature="AMtx7mjtTdh6vjQ7n6MHHoIMC+8wow7CeA=="/>
+      <go:slidesCustomData xmlns:go="http://customooxmlschemas.google.com/" r:id="rId7" roundtripDataSignature="AMtx7mhU/HVW5fjJqJbCpZyc+VwbESIL5g=="/>
     </p:ext>
   </p:extLst>
 </p:presentation>
@@ -1696,7 +1696,7 @@
   <p:cSld>
     <p:spTree>
       <p:nvGrpSpPr>
-        <p:cNvPr id="35" name="Shape 35"/>
+        <p:cNvPr id="27" name="Shape 27"/>
         <p:cNvGrpSpPr/>
         <p:nvPr/>
       </p:nvGrpSpPr>
@@ -1710,7 +1710,7 @@
       </p:grpSpPr>
       <p:sp>
         <p:nvSpPr>
-          <p:cNvPr id="36" name="Google Shape;36;p1:notes"/>
+          <p:cNvPr id="28" name="Google Shape;28;p1:notes"/>
           <p:cNvSpPr txBox="1"/>
           <p:nvPr>
             <p:ph idx="1" type="body"/>
@@ -1757,7 +1757,7 @@
       </p:sp>
       <p:sp>
         <p:nvSpPr>
-          <p:cNvPr id="37" name="Google Shape;37;p1:notes"/>
+          <p:cNvPr id="29" name="Google Shape;29;p1:notes"/>
           <p:cNvSpPr/>
           <p:nvPr>
             <p:ph idx="2" type="sldImg"/>
@@ -2108,54 +2108,6 @@
           </a:p>
         </p:txBody>
       </p:sp>
-      <p:sp>
-        <p:nvSpPr>
-          <p:cNvPr id="15" name="Google Shape;15;p3"/>
-          <p:cNvSpPr/>
-          <p:nvPr/>
-        </p:nvSpPr>
-        <p:spPr>
-          <a:xfrm>
-            <a:off x="143508" y="1448780"/>
-            <a:ext cx="8856900" cy="3960300"/>
-          </a:xfrm>
-          <a:prstGeom prst="rect">
-            <a:avLst/>
-          </a:prstGeom>
-          <a:solidFill>
-            <a:srgbClr val="FFFFFF"/>
-          </a:solidFill>
-          <a:ln>
-            <a:noFill/>
-          </a:ln>
-        </p:spPr>
-        <p:txBody>
-          <a:bodyPr anchorCtr="0" anchor="ctr" bIns="45700" lIns="91425" spcFirstLastPara="1" rIns="91425" wrap="square" tIns="45700">
-            <a:noAutofit/>
-          </a:bodyPr>
-          <a:lstStyle/>
-          <a:p>
-            <a:pPr indent="0" lvl="0" marL="0" marR="0" rtl="0" algn="ctr">
-              <a:spcBef>
-                <a:spcPts val="0"/>
-              </a:spcBef>
-              <a:spcAft>
-                <a:spcPts val="0"/>
-              </a:spcAft>
-              <a:buNone/>
-            </a:pPr>
-            <a:r>
-              <a:rPr lang="en-US" sz="5400">
-                <a:solidFill>
-                  <a:srgbClr val="987147"/>
-                </a:solidFill>
-              </a:rPr>
-              <a:t>{docname}</a:t>
-            </a:r>
-            <a:endParaRPr/>
-          </a:p>
-        </p:txBody>
-      </p:sp>
     </p:spTree>
   </p:cSld>
   <p:clrMapOvr>
@@ -2165,11 +2117,11 @@
 </file>
 
 <file path=ppt/slideLayouts/slideLayout2.xml><?xml version="1.0" encoding="utf-8"?>
-<p:sldLayout xmlns:a="http://schemas.openxmlformats.org/drawingml/2006/main" xmlns:ns2="http://schemas.openxmlformats.org/officeDocument/2006/relationships" xmlns:p="http://schemas.openxmlformats.org/presentationml/2006/main" matchingName="default">
+<p:sldLayout xmlns:a="http://schemas.openxmlformats.org/drawingml/2006/main" xmlns:r="http://schemas.openxmlformats.org/officeDocument/2006/relationships" xmlns:mc="http://schemas.openxmlformats.org/markup-compatibility/2006" xmlns:mv="urn:schemas-microsoft-com:mac:vml" xmlns:p="http://schemas.openxmlformats.org/presentationml/2006/main" xmlns:c="http://schemas.openxmlformats.org/drawingml/2006/chart" xmlns:dgm="http://schemas.openxmlformats.org/drawingml/2006/diagram" xmlns:o="urn:schemas-microsoft-com:office:office" xmlns:v="urn:schemas-microsoft-com:vml" xmlns:pvml="urn:schemas-microsoft-com:office:powerpoint" xmlns:com="http://schemas.openxmlformats.org/drawingml/2006/compatibility" xmlns:p14="http://schemas.microsoft.com/office/powerpoint/2010/main" xmlns:p15="http://schemas.microsoft.com/office/powerpoint/2012/main" xmlns:ahyp="http://schemas.microsoft.com/office/drawing/2018/hyperlinkcolor" matchingName="default">
   <p:cSld name="HB Title / Content">
     <p:spTree>
       <p:nvGrpSpPr>
-        <p:cNvPr id="16" name="Shape 16"/>
+        <p:cNvPr id="15" name="Shape 15"/>
         <p:cNvGrpSpPr/>
         <p:nvPr/>
       </p:nvGrpSpPr>
@@ -2183,166 +2135,7 @@
       </p:grpSpPr>
       <p:sp>
         <p:nvSpPr>
-          <p:cNvPr id="17" name="Google Shape;17;p4"/>
-          <p:cNvSpPr txBox="1"/>
-          <p:nvPr/>
-        </p:nvSpPr>
-        <p:spPr>
-          <a:xfrm>
-            <a:off x="249924" y="1100971"/>
-            <a:ext cx="4213800" cy="498600"/>
-          </a:xfrm>
-          <a:prstGeom prst="rect">
-            <a:avLst/>
-          </a:prstGeom>
-          <a:noFill/>
-          <a:ln>
-            <a:noFill/>
-          </a:ln>
-        </p:spPr>
-        <p:txBody>
-          <a:bodyPr anchorCtr="0" anchor="t" bIns="91425" lIns="91425" spcFirstLastPara="1" rIns="91425" wrap="square" tIns="91425">
-            <a:spAutoFit/>
-          </a:bodyPr>
-          <a:lstStyle/>
-          <a:p>
-            <a:pPr indent="0" lvl="0" marL="0" rtl="0" algn="l">
-              <a:lnSpc>
-                <a:spcPct val="85000"/>
-              </a:lnSpc>
-              <a:spcBef>
-                <a:spcPts val="0"/>
-              </a:spcBef>
-              <a:spcAft>
-                <a:spcPts val="0"/>
-              </a:spcAft>
-              <a:buNone/>
-            </a:pPr>
-            <a:r>
-              <a:rPr lang="en-US" sz="2400">
-                <a:solidFill>
-                  <a:schemeClr val="dk1"/>
-                </a:solidFill>
-              </a:rPr>
-              <a:t>{code}</a:t>
-            </a:r>
-            <a:endParaRPr sz="2400">
-              <a:solidFill>
-                <a:schemeClr val="accent2"/>
-              </a:solidFill>
-            </a:endParaRPr>
-          </a:p>
-        </p:txBody>
-      </p:sp>
-      <p:sp>
-        <p:nvSpPr>
-          <p:cNvPr id="18" name="Google Shape;18;p4"/>
-          <p:cNvSpPr txBox="1"/>
-          <p:nvPr/>
-        </p:nvSpPr>
-        <p:spPr>
-          <a:xfrm>
-            <a:off x="249924" y="788950"/>
-            <a:ext cx="4213800" cy="498600"/>
-          </a:xfrm>
-          <a:prstGeom prst="rect">
-            <a:avLst/>
-          </a:prstGeom>
-          <a:noFill/>
-          <a:ln>
-            <a:noFill/>
-          </a:ln>
-        </p:spPr>
-        <p:txBody>
-          <a:bodyPr anchorCtr="0" anchor="t" bIns="91425" lIns="91425" spcFirstLastPara="1" rIns="91425" wrap="square" tIns="91425">
-            <a:spAutoFit/>
-          </a:bodyPr>
-          <a:lstStyle/>
-          <a:p>
-            <a:pPr indent="0" lvl="0" marL="0" rtl="0" algn="l">
-              <a:lnSpc>
-                <a:spcPct val="85000"/>
-              </a:lnSpc>
-              <a:spcBef>
-                <a:spcPts val="0"/>
-              </a:spcBef>
-              <a:spcAft>
-                <a:spcPts val="0"/>
-              </a:spcAft>
-              <a:buNone/>
-            </a:pPr>
-            <a:r>
-              <a:rPr lang="en-US" sz="2400">
-                <a:solidFill>
-                  <a:schemeClr val="accent2"/>
-                </a:solidFill>
-              </a:rPr>
-              <a:t>{category}</a:t>
-            </a:r>
-            <a:endParaRPr sz="1200">
-              <a:solidFill>
-                <a:srgbClr val="00B0F0"/>
-              </a:solidFill>
-            </a:endParaRPr>
-          </a:p>
-        </p:txBody>
-      </p:sp>
-      <p:sp>
-        <p:nvSpPr>
-          <p:cNvPr id="19" name="Google Shape;19;p4"/>
-          <p:cNvSpPr txBox="1"/>
-          <p:nvPr/>
-        </p:nvSpPr>
-        <p:spPr>
-          <a:xfrm>
-            <a:off x="735392" y="368515"/>
-            <a:ext cx="3000000" cy="341700"/>
-          </a:xfrm>
-          <a:prstGeom prst="rect">
-            <a:avLst/>
-          </a:prstGeom>
-          <a:noFill/>
-          <a:ln>
-            <a:noFill/>
-          </a:ln>
-        </p:spPr>
-        <p:txBody>
-          <a:bodyPr anchorCtr="0" anchor="t" bIns="91425" lIns="91425" spcFirstLastPara="1" rIns="91425" wrap="square" tIns="91425">
-            <a:spAutoFit/>
-          </a:bodyPr>
-          <a:lstStyle/>
-          <a:p>
-            <a:pPr indent="0" lvl="0" marL="0" rtl="0" algn="l">
-              <a:lnSpc>
-                <a:spcPct val="85000"/>
-              </a:lnSpc>
-              <a:spcBef>
-                <a:spcPts val="0"/>
-              </a:spcBef>
-              <a:spcAft>
-                <a:spcPts val="0"/>
-              </a:spcAft>
-              <a:buNone/>
-            </a:pPr>
-            <a:r>
-              <a:rPr lang="en-US" sz="1200">
-                <a:solidFill>
-                  <a:srgbClr val="00B0F0"/>
-                </a:solidFill>
-              </a:rPr>
-              <a:t>{season}</a:t>
-            </a:r>
-            <a:endParaRPr sz="1200">
-              <a:solidFill>
-                <a:srgbClr val="00B0F0"/>
-              </a:solidFill>
-            </a:endParaRPr>
-          </a:p>
-        </p:txBody>
-      </p:sp>
-      <p:sp>
-        <p:nvSpPr>
-          <p:cNvPr id="20" name="Google Shape;20;p4"/>
+          <p:cNvPr id="16" name="Google Shape;16;p4"/>
           <p:cNvSpPr txBox="1"/>
           <p:nvPr>
             <p:ph idx="12" type="sldNum"/>
@@ -2625,7 +2418,7 @@
       </p:sp>
       <p:sp>
         <p:nvSpPr>
-          <p:cNvPr id="21" name="Google Shape;21;p4"/>
+          <p:cNvPr id="17" name="Google Shape;17;p4"/>
           <p:cNvSpPr/>
           <p:nvPr/>
         </p:nvSpPr>
@@ -2688,7 +2481,7 @@
       </p:sp>
       <p:sp>
         <p:nvSpPr>
-          <p:cNvPr id="22" name="Google Shape;22;p4"/>
+          <p:cNvPr id="18" name="Google Shape;18;p4"/>
           <p:cNvSpPr txBox="1"/>
           <p:nvPr/>
         </p:nvSpPr>
@@ -2733,9 +2526,9 @@
                 <a:solidFill>
                   <a:schemeClr val="accent2"/>
                 </a:solidFill>
-                <a:latin typeface="Averta Light"/>
-                <a:ea typeface="Averta Light"/>
-                <a:cs typeface="Averta Light"/>
+                <a:latin typeface="Arial"/>
+                <a:ea typeface="Arial"/>
+                <a:cs typeface="Arial"/>
                 <a:sym typeface="Arial"/>
               </a:rPr>
               <a:t>APPROVAL CONFIRM</a:t>
@@ -2744,9 +2537,9 @@
               <a:solidFill>
                 <a:schemeClr val="accent2"/>
               </a:solidFill>
-              <a:latin typeface="Averta Light"/>
-              <a:ea typeface="Averta Light"/>
-              <a:cs typeface="Averta Light"/>
+              <a:latin typeface="Arial"/>
+              <a:ea typeface="Arial"/>
+              <a:cs typeface="Arial"/>
               <a:sym typeface="Arial"/>
             </a:endParaRPr>
           </a:p>
@@ -2754,7 +2547,7 @@
       </p:sp>
       <p:sp>
         <p:nvSpPr>
-          <p:cNvPr id="23" name="Google Shape;23;p4"/>
+          <p:cNvPr id="19" name="Google Shape;19;p4"/>
           <p:cNvSpPr/>
           <p:nvPr/>
         </p:nvSpPr>
@@ -2819,7 +2612,7 @@
       </p:sp>
       <p:sp>
         <p:nvSpPr>
-          <p:cNvPr id="24" name="Google Shape;24;p4"/>
+          <p:cNvPr id="20" name="Google Shape;20;p4"/>
           <p:cNvSpPr/>
           <p:nvPr/>
         </p:nvSpPr>
@@ -2884,7 +2677,7 @@
       </p:sp>
       <p:sp>
         <p:nvSpPr>
-          <p:cNvPr id="25" name="Google Shape;25;p4"/>
+          <p:cNvPr id="21" name="Google Shape;21;p4"/>
           <p:cNvSpPr txBox="1"/>
           <p:nvPr/>
         </p:nvSpPr>
@@ -2929,9 +2722,9 @@
                 <a:solidFill>
                   <a:schemeClr val="dk1"/>
                 </a:solidFill>
-                <a:latin typeface="Averta Light"/>
-                <a:ea typeface="Averta Light"/>
-                <a:cs typeface="Averta Light"/>
+                <a:latin typeface="Arial"/>
+                <a:ea typeface="Arial"/>
+                <a:cs typeface="Arial"/>
                 <a:sym typeface="Arial"/>
               </a:rPr>
               <a:t>LOGO</a:t>
@@ -2940,9 +2733,9 @@
               <a:solidFill>
                 <a:schemeClr val="dk1"/>
               </a:solidFill>
-              <a:latin typeface="Averta Light"/>
-              <a:ea typeface="Averta Light"/>
-              <a:cs typeface="Averta Light"/>
+              <a:latin typeface="Arial"/>
+              <a:ea typeface="Arial"/>
+              <a:cs typeface="Arial"/>
               <a:sym typeface="Arial"/>
             </a:endParaRPr>
           </a:p>
@@ -2950,7 +2743,7 @@
       </p:sp>
       <p:sp>
         <p:nvSpPr>
-          <p:cNvPr id="26" name="Google Shape;26;p4"/>
+          <p:cNvPr id="22" name="Google Shape;22;p4"/>
           <p:cNvSpPr txBox="1"/>
           <p:nvPr/>
         </p:nvSpPr>
@@ -2995,9 +2788,9 @@
                 <a:solidFill>
                   <a:schemeClr val="dk1"/>
                 </a:solidFill>
-                <a:latin typeface="Averta Light"/>
-                <a:ea typeface="Averta Light"/>
-                <a:cs typeface="Averta Light"/>
+                <a:latin typeface="Arial"/>
+                <a:ea typeface="Arial"/>
+                <a:cs typeface="Arial"/>
                 <a:sym typeface="Arial"/>
               </a:rPr>
               <a:t>ARTWORK</a:t>
@@ -3006,9 +2799,9 @@
               <a:solidFill>
                 <a:schemeClr val="dk1"/>
               </a:solidFill>
-              <a:latin typeface="Averta Light"/>
-              <a:ea typeface="Averta Light"/>
-              <a:cs typeface="Averta Light"/>
+              <a:latin typeface="Arial"/>
+              <a:ea typeface="Arial"/>
+              <a:cs typeface="Arial"/>
               <a:sym typeface="Arial"/>
             </a:endParaRPr>
           </a:p>
@@ -3016,7 +2809,7 @@
       </p:sp>
       <p:sp>
         <p:nvSpPr>
-          <p:cNvPr id="27" name="Google Shape;27;p4"/>
+          <p:cNvPr id="23" name="Google Shape;23;p4"/>
           <p:cNvSpPr txBox="1"/>
           <p:nvPr/>
         </p:nvSpPr>
@@ -3061,9 +2854,9 @@
                 <a:solidFill>
                   <a:schemeClr val="dk1"/>
                 </a:solidFill>
-                <a:latin typeface="Averta Light"/>
-                <a:ea typeface="Averta Light"/>
-                <a:cs typeface="Averta Light"/>
+                <a:latin typeface="Arial"/>
+                <a:ea typeface="Arial"/>
+                <a:cs typeface="Arial"/>
                 <a:sym typeface="Arial"/>
               </a:rPr>
               <a:t> RRP : Undecided</a:t>
@@ -3072,9 +2865,9 @@
               <a:solidFill>
                 <a:schemeClr val="dk1"/>
               </a:solidFill>
-              <a:latin typeface="Averta Light"/>
-              <a:ea typeface="Averta Light"/>
-              <a:cs typeface="Averta Light"/>
+              <a:latin typeface="Arial"/>
+              <a:ea typeface="Arial"/>
+              <a:cs typeface="Arial"/>
               <a:sym typeface="Arial"/>
             </a:endParaRPr>
           </a:p>
@@ -3082,7 +2875,7 @@
       </p:sp>
       <p:sp>
         <p:nvSpPr>
-          <p:cNvPr id="28" name="Google Shape;28;p4"/>
+          <p:cNvPr id="24" name="Google Shape;24;p4"/>
           <p:cNvSpPr txBox="1"/>
           <p:nvPr/>
         </p:nvSpPr>
@@ -3127,9 +2920,9 @@
                 <a:solidFill>
                   <a:schemeClr val="dk1"/>
                 </a:solidFill>
-                <a:latin typeface="Averta Light"/>
-                <a:ea typeface="Averta Light"/>
-                <a:cs typeface="Averta Light"/>
+                <a:latin typeface="Arial"/>
+                <a:ea typeface="Arial"/>
+                <a:cs typeface="Arial"/>
                 <a:sym typeface="Arial"/>
               </a:rPr>
               <a:t>Colorway </a:t>
@@ -3138,9 +2931,9 @@
               <a:solidFill>
                 <a:schemeClr val="dk1"/>
               </a:solidFill>
-              <a:latin typeface="Averta Light"/>
-              <a:ea typeface="Averta Light"/>
-              <a:cs typeface="Averta Light"/>
+              <a:latin typeface="Arial"/>
+              <a:ea typeface="Arial"/>
+              <a:cs typeface="Arial"/>
               <a:sym typeface="Arial"/>
             </a:endParaRPr>
           </a:p>
@@ -3148,7 +2941,7 @@
       </p:sp>
       <p:sp>
         <p:nvSpPr>
-          <p:cNvPr id="29" name="Google Shape;29;p4"/>
+          <p:cNvPr id="25" name="Google Shape;25;p4"/>
           <p:cNvSpPr txBox="1"/>
           <p:nvPr/>
         </p:nvSpPr>
@@ -3214,12 +3007,12 @@
       </p:sp>
       <p:pic>
         <p:nvPicPr>
-          <p:cNvPr id="30" name="Google Shape;30;p4"/>
+          <p:cNvPr id="26" name="Google Shape;26;p4"/>
           <p:cNvPicPr preferRelativeResize="0"/>
           <p:nvPr/>
         </p:nvPicPr>
         <p:blipFill rotWithShape="1">
-          <a:blip ns2:embed="rId2">
+          <a:blip r:embed="rId2">
             <a:alphaModFix/>
           </a:blip>
           <a:srcRect b="0" l="0" r="0" t="0"/>
@@ -3239,94 +3032,6 @@
           </a:ln>
         </p:spPr>
       </p:pic>
-      <p:sp>
-        <p:nvSpPr>
-          <p:cNvPr id="31" name="Google Shape;31;p4"/>
-          <p:cNvSpPr/>
-          <p:nvPr>
-            <p:ph idx="2" type="pic"/>
-          </p:nvPr>
-        </p:nvSpPr>
-        <p:spPr>
-          <a:xfrm>
-            <a:off x="4827475" y="1515850"/>
-            <a:ext cx="1029600" cy="846300"/>
-          </a:xfrm>
-          <a:prstGeom prst="rect">
-            <a:avLst/>
-          </a:prstGeom>
-          <a:noFill/>
-          <a:ln>
-            <a:noFill/>
-          </a:ln>
-        </p:spPr>
-      </p:sp>
-      <p:sp>
-        <p:nvSpPr>
-          <p:cNvPr id="32" name="Google Shape;32;p4"/>
-          <p:cNvSpPr/>
-          <p:nvPr>
-            <p:ph idx="3" type="pic"/>
-          </p:nvPr>
-        </p:nvSpPr>
-        <p:spPr>
-          <a:xfrm>
-            <a:off x="4827475" y="2778300"/>
-            <a:ext cx="1029600" cy="668700"/>
-          </a:xfrm>
-          <a:prstGeom prst="rect">
-            <a:avLst/>
-          </a:prstGeom>
-          <a:noFill/>
-          <a:ln>
-            <a:noFill/>
-          </a:ln>
-        </p:spPr>
-      </p:sp>
-      <p:sp>
-        <p:nvSpPr>
-          <p:cNvPr id="33" name="Google Shape;33;p4"/>
-          <p:cNvSpPr/>
-          <p:nvPr>
-            <p:ph idx="4" type="pic"/>
-          </p:nvPr>
-        </p:nvSpPr>
-        <p:spPr>
-          <a:xfrm>
-            <a:off x="4827475" y="3590050"/>
-            <a:ext cx="1029600" cy="668700"/>
-          </a:xfrm>
-          <a:prstGeom prst="rect">
-            <a:avLst/>
-          </a:prstGeom>
-          <a:noFill/>
-          <a:ln>
-            <a:noFill/>
-          </a:ln>
-        </p:spPr>
-      </p:sp>
-      <p:sp>
-        <p:nvSpPr>
-          <p:cNvPr id="34" name="Google Shape;34;p4"/>
-          <p:cNvSpPr/>
-          <p:nvPr>
-            <p:ph idx="5" type="pic"/>
-          </p:nvPr>
-        </p:nvSpPr>
-        <p:spPr>
-          <a:xfrm>
-            <a:off x="4827475" y="4401800"/>
-            <a:ext cx="1029600" cy="668700"/>
-          </a:xfrm>
-          <a:prstGeom prst="rect">
-            <a:avLst/>
-          </a:prstGeom>
-          <a:noFill/>
-          <a:ln>
-            <a:noFill/>
-          </a:ln>
-        </p:spPr>
-      </p:sp>
     </p:spTree>
   </p:cSld>
   <p:clrMapOvr>
@@ -4496,7 +4201,7 @@
   <p:cSld>
     <p:spTree>
       <p:nvGrpSpPr>
-        <p:cNvPr id="38" name="Shape 38"/>
+        <p:cNvPr id="30" name="Shape 30"/>
         <p:cNvGrpSpPr/>
         <p:nvPr/>
       </p:nvGrpSpPr>
@@ -4510,7 +4215,7 @@
       </p:grpSpPr>
       <p:sp>
         <p:nvSpPr>
-          <p:cNvPr id="39" name="Google Shape;39;p1"/>
+          <p:cNvPr id="31" name="Google Shape;31;p1"/>
           <p:cNvSpPr txBox="1"/>
           <p:nvPr>
             <p:ph idx="12" type="sldNum"/>
@@ -4536,6 +4241,9 @@
           <a:lstStyle/>
           <a:p>
             <a:pPr indent="0" lvl="0" marL="0" rtl="0" algn="l">
+              <a:lnSpc>
+                <a:spcPct val="100000"/>
+              </a:lnSpc>
               <a:spcBef>
                 <a:spcPts val="0"/>
               </a:spcBef>
@@ -4570,6 +4278,285 @@
 </file>
 
 <file path=ppt/theme/theme1.xml><?xml version="1.0" encoding="utf-8"?>
+<a:theme xmlns:a="http://schemas.openxmlformats.org/drawingml/2006/main" xmlns:r="http://schemas.openxmlformats.org/officeDocument/2006/relationships" name="Office Theme">
+  <a:themeElements>
+    <a:clrScheme name="Hugo Boss">
+      <a:dk1>
+        <a:srgbClr val="000000"/>
+      </a:dk1>
+      <a:lt1>
+        <a:srgbClr val="FFFFFF"/>
+      </a:lt1>
+      <a:dk2>
+        <a:srgbClr val="4B4B4B"/>
+      </a:dk2>
+      <a:lt2>
+        <a:srgbClr val="B9B9B9"/>
+      </a:lt2>
+      <a:accent1>
+        <a:srgbClr val="B61F29"/>
+      </a:accent1>
+      <a:accent2>
+        <a:srgbClr val="987107"/>
+      </a:accent2>
+      <a:accent3>
+        <a:srgbClr val="EDEDED"/>
+      </a:accent3>
+      <a:accent4>
+        <a:srgbClr val="D0D0D0"/>
+      </a:accent4>
+      <a:accent5>
+        <a:srgbClr val="929292"/>
+      </a:accent5>
+      <a:accent6>
+        <a:srgbClr val="4A4A4A"/>
+      </a:accent6>
+      <a:hlink>
+        <a:srgbClr val="000000"/>
+      </a:hlink>
+      <a:folHlink>
+        <a:srgbClr val="000000"/>
+      </a:folHlink>
+    </a:clrScheme>
+    <a:fontScheme name="Office">
+      <a:majorFont>
+        <a:latin typeface="Arial"/>
+        <a:ea typeface=""/>
+        <a:cs typeface=""/>
+        <a:font script="Jpan" typeface="ＭＳ Ｐゴシック"/>
+        <a:font script="Hang" typeface="맑은 고딕"/>
+        <a:font script="Hans" typeface="宋体"/>
+        <a:font script="Hant" typeface="新細明體"/>
+        <a:font script="Arab" typeface="Times New Roman"/>
+        <a:font script="Hebr" typeface="Times New Roman"/>
+        <a:font script="Thai" typeface="Angsana New"/>
+        <a:font script="Ethi" typeface="Nyala"/>
+        <a:font script="Beng" typeface="Vrinda"/>
+        <a:font script="Gujr" typeface="Shruti"/>
+        <a:font script="Khmr" typeface="MoolBoran"/>
+        <a:font script="Knda" typeface="Tunga"/>
+        <a:font script="Guru" typeface="Raavi"/>
+        <a:font script="Cans" typeface="Euphemia"/>
+        <a:font script="Cher" typeface="Plantagenet Cherokee"/>
+        <a:font script="Yiii" typeface="Microsoft Yi Baiti"/>
+        <a:font script="Tibt" typeface="Microsoft Himalaya"/>
+        <a:font script="Thaa" typeface="MV Boli"/>
+        <a:font script="Deva" typeface="Mangal"/>
+        <a:font script="Telu" typeface="Gautami"/>
+        <a:font script="Taml" typeface="Latha"/>
+        <a:font script="Syrc" typeface="Estrangelo Edessa"/>
+        <a:font script="Orya" typeface="Kalinga"/>
+        <a:font script="Mlym" typeface="Kartika"/>
+        <a:font script="Laoo" typeface="DokChampa"/>
+        <a:font script="Sinh" typeface="Iskoola Pota"/>
+        <a:font script="Mong" typeface="Mongolian Baiti"/>
+        <a:font script="Viet" typeface="Times New Roman"/>
+        <a:font script="Uigh" typeface="Microsoft Uighur"/>
+        <a:font script="Geor" typeface="Sylfaen"/>
+      </a:majorFont>
+      <a:minorFont>
+        <a:latin typeface="Arial"/>
+        <a:ea typeface=""/>
+        <a:cs typeface=""/>
+        <a:font script="Jpan" typeface="ＭＳ Ｐゴシック"/>
+        <a:font script="Hang" typeface="맑은 고딕"/>
+        <a:font script="Hans" typeface="宋体"/>
+        <a:font script="Hant" typeface="新細明體"/>
+        <a:font script="Arab" typeface="Arial"/>
+        <a:font script="Hebr" typeface="Arial"/>
+        <a:font script="Thai" typeface="Cordia New"/>
+        <a:font script="Ethi" typeface="Nyala"/>
+        <a:font script="Beng" typeface="Vrinda"/>
+        <a:font script="Gujr" typeface="Shruti"/>
+        <a:font script="Khmr" typeface="DaunPenh"/>
+        <a:font script="Knda" typeface="Tunga"/>
+        <a:font script="Guru" typeface="Raavi"/>
+        <a:font script="Cans" typeface="Euphemia"/>
+        <a:font script="Cher" typeface="Plantagenet Cherokee"/>
+        <a:font script="Yiii" typeface="Microsoft Yi Baiti"/>
+        <a:font script="Tibt" typeface="Microsoft Himalaya"/>
+        <a:font script="Thaa" typeface="MV Boli"/>
+        <a:font script="Deva" typeface="Mangal"/>
+        <a:font script="Telu" typeface="Gautami"/>
+        <a:font script="Taml" typeface="Latha"/>
+        <a:font script="Syrc" typeface="Estrangelo Edessa"/>
+        <a:font script="Orya" typeface="Kalinga"/>
+        <a:font script="Mlym" typeface="Kartika"/>
+        <a:font script="Laoo" typeface="DokChampa"/>
+        <a:font script="Sinh" typeface="Iskoola Pota"/>
+        <a:font script="Mong" typeface="Mongolian Baiti"/>
+        <a:font script="Viet" typeface="Arial"/>
+        <a:font script="Uigh" typeface="Microsoft Uighur"/>
+        <a:font script="Geor" typeface="Sylfaen"/>
+      </a:minorFont>
+    </a:fontScheme>
+    <a:fmtScheme name="Office">
+      <a:fillStyleLst>
+        <a:solidFill>
+          <a:schemeClr val="phClr"/>
+        </a:solidFill>
+        <a:gradFill rotWithShape="1">
+          <a:gsLst>
+            <a:gs pos="0">
+              <a:schemeClr val="phClr">
+                <a:tint val="50000"/>
+                <a:satMod val="300000"/>
+              </a:schemeClr>
+            </a:gs>
+            <a:gs pos="35000">
+              <a:schemeClr val="phClr">
+                <a:tint val="37000"/>
+                <a:satMod val="300000"/>
+              </a:schemeClr>
+            </a:gs>
+            <a:gs pos="100000">
+              <a:schemeClr val="phClr">
+                <a:tint val="15000"/>
+                <a:satMod val="350000"/>
+              </a:schemeClr>
+            </a:gs>
+          </a:gsLst>
+          <a:lin ang="16200000" scaled="1"/>
+        </a:gradFill>
+        <a:gradFill rotWithShape="1">
+          <a:gsLst>
+            <a:gs pos="0">
+              <a:schemeClr val="phClr">
+                <a:tint val="100000"/>
+                <a:shade val="100000"/>
+                <a:satMod val="130000"/>
+              </a:schemeClr>
+            </a:gs>
+            <a:gs pos="100000">
+              <a:schemeClr val="phClr">
+                <a:tint val="50000"/>
+                <a:shade val="100000"/>
+                <a:satMod val="350000"/>
+              </a:schemeClr>
+            </a:gs>
+          </a:gsLst>
+          <a:lin ang="16200000" scaled="0"/>
+        </a:gradFill>
+      </a:fillStyleLst>
+      <a:lnStyleLst>
+        <a:ln w="9525" cap="flat" cmpd="sng" algn="ctr">
+          <a:solidFill>
+            <a:schemeClr val="phClr">
+              <a:shade val="95000"/>
+              <a:satMod val="105000"/>
+            </a:schemeClr>
+          </a:solidFill>
+          <a:prstDash val="solid"/>
+        </a:ln>
+        <a:ln w="25400" cap="flat" cmpd="sng" algn="ctr">
+          <a:solidFill>
+            <a:schemeClr val="phClr"/>
+          </a:solidFill>
+          <a:prstDash val="solid"/>
+        </a:ln>
+        <a:ln w="38100" cap="flat" cmpd="sng" algn="ctr">
+          <a:solidFill>
+            <a:schemeClr val="phClr"/>
+          </a:solidFill>
+          <a:prstDash val="solid"/>
+        </a:ln>
+      </a:lnStyleLst>
+      <a:effectStyleLst>
+        <a:effectStyle>
+          <a:effectLst>
+            <a:outerShdw blurRad="40000" dist="20000" dir="5400000" rotWithShape="0">
+              <a:srgbClr val="000000">
+                <a:alpha val="38000"/>
+              </a:srgbClr>
+            </a:outerShdw>
+          </a:effectLst>
+        </a:effectStyle>
+        <a:effectStyle>
+          <a:effectLst>
+            <a:outerShdw blurRad="40000" dist="23000" dir="5400000" rotWithShape="0">
+              <a:srgbClr val="000000">
+                <a:alpha val="35000"/>
+              </a:srgbClr>
+            </a:outerShdw>
+          </a:effectLst>
+        </a:effectStyle>
+        <a:effectStyle>
+          <a:effectLst>
+            <a:outerShdw blurRad="40000" dist="23000" dir="5400000" rotWithShape="0">
+              <a:srgbClr val="000000">
+                <a:alpha val="35000"/>
+              </a:srgbClr>
+            </a:outerShdw>
+          </a:effectLst>
+          <a:scene3d>
+            <a:camera prst="orthographicFront">
+              <a:rot lat="0" lon="0" rev="0"/>
+            </a:camera>
+            <a:lightRig rig="threePt" dir="t">
+              <a:rot lat="0" lon="0" rev="1200000"/>
+            </a:lightRig>
+          </a:scene3d>
+          <a:sp3d>
+            <a:bevelT w="63500" h="25400"/>
+          </a:sp3d>
+        </a:effectStyle>
+      </a:effectStyleLst>
+      <a:bgFillStyleLst>
+        <a:solidFill>
+          <a:schemeClr val="phClr"/>
+        </a:solidFill>
+        <a:gradFill rotWithShape="1">
+          <a:gsLst>
+            <a:gs pos="0">
+              <a:schemeClr val="phClr">
+                <a:tint val="40000"/>
+                <a:satMod val="350000"/>
+              </a:schemeClr>
+            </a:gs>
+            <a:gs pos="40000">
+              <a:schemeClr val="phClr">
+                <a:tint val="45000"/>
+                <a:shade val="99000"/>
+                <a:satMod val="350000"/>
+              </a:schemeClr>
+            </a:gs>
+            <a:gs pos="100000">
+              <a:schemeClr val="phClr">
+                <a:shade val="20000"/>
+                <a:satMod val="255000"/>
+              </a:schemeClr>
+            </a:gs>
+          </a:gsLst>
+          <a:path path="circle">
+            <a:fillToRect l="50000" t="-80000" r="50000" b="180000"/>
+          </a:path>
+        </a:gradFill>
+        <a:gradFill rotWithShape="1">
+          <a:gsLst>
+            <a:gs pos="0">
+              <a:schemeClr val="phClr">
+                <a:tint val="80000"/>
+                <a:satMod val="300000"/>
+              </a:schemeClr>
+            </a:gs>
+            <a:gs pos="100000">
+              <a:schemeClr val="phClr">
+                <a:shade val="30000"/>
+                <a:satMod val="200000"/>
+              </a:schemeClr>
+            </a:gs>
+          </a:gsLst>
+          <a:path path="circle">
+            <a:fillToRect l="50000" t="50000" r="50000" b="50000"/>
+          </a:path>
+        </a:gradFill>
+      </a:bgFillStyleLst>
+    </a:fmtScheme>
+  </a:themeElements>
+</a:theme>
+</file>
+
+<file path=ppt/theme/theme2.xml><?xml version="1.0" encoding="utf-8"?>
 <a:theme xmlns:a="http://schemas.openxmlformats.org/drawingml/2006/main" xmlns:r="http://schemas.openxmlformats.org/officeDocument/2006/relationships" name="Template">
   <a:themeElements>
     <a:clrScheme name="Hugo Boss">
@@ -4846,283 +4833,4 @@
     </a:fmtScheme>
   </a:themeElements>
 </a:theme>
-</file>
-
-<file path=ppt/theme/theme2.xml><?xml version="1.0" encoding="utf-8"?>
-<a:theme xmlns:a="http://schemas.openxmlformats.org/drawingml/2006/main" xmlns:r="http://schemas.openxmlformats.org/officeDocument/2006/relationships" name="Office Theme">
-  <a:themeElements>
-    <a:clrScheme name="Hugo Boss">
-      <a:dk1>
-        <a:srgbClr val="000000"/>
-      </a:dk1>
-      <a:lt1>
-        <a:srgbClr val="FFFFFF"/>
-      </a:lt1>
-      <a:dk2>
-        <a:srgbClr val="4B4B4B"/>
-      </a:dk2>
-      <a:lt2>
-        <a:srgbClr val="B9B9B9"/>
-      </a:lt2>
-      <a:accent1>
-        <a:srgbClr val="B61F29"/>
-      </a:accent1>
-      <a:accent2>
-        <a:srgbClr val="987107"/>
-      </a:accent2>
-      <a:accent3>
-        <a:srgbClr val="EDEDED"/>
-      </a:accent3>
-      <a:accent4>
-        <a:srgbClr val="D0D0D0"/>
-      </a:accent4>
-      <a:accent5>
-        <a:srgbClr val="929292"/>
-      </a:accent5>
-      <a:accent6>
-        <a:srgbClr val="4A4A4A"/>
-      </a:accent6>
-      <a:hlink>
-        <a:srgbClr val="000000"/>
-      </a:hlink>
-      <a:folHlink>
-        <a:srgbClr val="000000"/>
-      </a:folHlink>
-    </a:clrScheme>
-    <a:fontScheme name="Office">
-      <a:majorFont>
-        <a:latin typeface="Arial"/>
-        <a:ea typeface=""/>
-        <a:cs typeface=""/>
-        <a:font script="Jpan" typeface="ＭＳ Ｐゴシック"/>
-        <a:font script="Hang" typeface="맑은 고딕"/>
-        <a:font script="Hans" typeface="宋体"/>
-        <a:font script="Hant" typeface="新細明體"/>
-        <a:font script="Arab" typeface="Times New Roman"/>
-        <a:font script="Hebr" typeface="Times New Roman"/>
-        <a:font script="Thai" typeface="Angsana New"/>
-        <a:font script="Ethi" typeface="Nyala"/>
-        <a:font script="Beng" typeface="Vrinda"/>
-        <a:font script="Gujr" typeface="Shruti"/>
-        <a:font script="Khmr" typeface="MoolBoran"/>
-        <a:font script="Knda" typeface="Tunga"/>
-        <a:font script="Guru" typeface="Raavi"/>
-        <a:font script="Cans" typeface="Euphemia"/>
-        <a:font script="Cher" typeface="Plantagenet Cherokee"/>
-        <a:font script="Yiii" typeface="Microsoft Yi Baiti"/>
-        <a:font script="Tibt" typeface="Microsoft Himalaya"/>
-        <a:font script="Thaa" typeface="MV Boli"/>
-        <a:font script="Deva" typeface="Mangal"/>
-        <a:font script="Telu" typeface="Gautami"/>
-        <a:font script="Taml" typeface="Latha"/>
-        <a:font script="Syrc" typeface="Estrangelo Edessa"/>
-        <a:font script="Orya" typeface="Kalinga"/>
-        <a:font script="Mlym" typeface="Kartika"/>
-        <a:font script="Laoo" typeface="DokChampa"/>
-        <a:font script="Sinh" typeface="Iskoola Pota"/>
-        <a:font script="Mong" typeface="Mongolian Baiti"/>
-        <a:font script="Viet" typeface="Times New Roman"/>
-        <a:font script="Uigh" typeface="Microsoft Uighur"/>
-        <a:font script="Geor" typeface="Sylfaen"/>
-      </a:majorFont>
-      <a:minorFont>
-        <a:latin typeface="Arial"/>
-        <a:ea typeface=""/>
-        <a:cs typeface=""/>
-        <a:font script="Jpan" typeface="ＭＳ Ｐゴシック"/>
-        <a:font script="Hang" typeface="맑은 고딕"/>
-        <a:font script="Hans" typeface="宋体"/>
-        <a:font script="Hant" typeface="新細明體"/>
-        <a:font script="Arab" typeface="Arial"/>
-        <a:font script="Hebr" typeface="Arial"/>
-        <a:font script="Thai" typeface="Cordia New"/>
-        <a:font script="Ethi" typeface="Nyala"/>
-        <a:font script="Beng" typeface="Vrinda"/>
-        <a:font script="Gujr" typeface="Shruti"/>
-        <a:font script="Khmr" typeface="DaunPenh"/>
-        <a:font script="Knda" typeface="Tunga"/>
-        <a:font script="Guru" typeface="Raavi"/>
-        <a:font script="Cans" typeface="Euphemia"/>
-        <a:font script="Cher" typeface="Plantagenet Cherokee"/>
-        <a:font script="Yiii" typeface="Microsoft Yi Baiti"/>
-        <a:font script="Tibt" typeface="Microsoft Himalaya"/>
-        <a:font script="Thaa" typeface="MV Boli"/>
-        <a:font script="Deva" typeface="Mangal"/>
-        <a:font script="Telu" typeface="Gautami"/>
-        <a:font script="Taml" typeface="Latha"/>
-        <a:font script="Syrc" typeface="Estrangelo Edessa"/>
-        <a:font script="Orya" typeface="Kalinga"/>
-        <a:font script="Mlym" typeface="Kartika"/>
-        <a:font script="Laoo" typeface="DokChampa"/>
-        <a:font script="Sinh" typeface="Iskoola Pota"/>
-        <a:font script="Mong" typeface="Mongolian Baiti"/>
-        <a:font script="Viet" typeface="Arial"/>
-        <a:font script="Uigh" typeface="Microsoft Uighur"/>
-        <a:font script="Geor" typeface="Sylfaen"/>
-      </a:minorFont>
-    </a:fontScheme>
-    <a:fmtScheme name="Office">
-      <a:fillStyleLst>
-        <a:solidFill>
-          <a:schemeClr val="phClr"/>
-        </a:solidFill>
-        <a:gradFill rotWithShape="1">
-          <a:gsLst>
-            <a:gs pos="0">
-              <a:schemeClr val="phClr">
-                <a:tint val="50000"/>
-                <a:satMod val="300000"/>
-              </a:schemeClr>
-            </a:gs>
-            <a:gs pos="35000">
-              <a:schemeClr val="phClr">
-                <a:tint val="37000"/>
-                <a:satMod val="300000"/>
-              </a:schemeClr>
-            </a:gs>
-            <a:gs pos="100000">
-              <a:schemeClr val="phClr">
-                <a:tint val="15000"/>
-                <a:satMod val="350000"/>
-              </a:schemeClr>
-            </a:gs>
-          </a:gsLst>
-          <a:lin ang="16200000" scaled="1"/>
-        </a:gradFill>
-        <a:gradFill rotWithShape="1">
-          <a:gsLst>
-            <a:gs pos="0">
-              <a:schemeClr val="phClr">
-                <a:tint val="100000"/>
-                <a:shade val="100000"/>
-                <a:satMod val="130000"/>
-              </a:schemeClr>
-            </a:gs>
-            <a:gs pos="100000">
-              <a:schemeClr val="phClr">
-                <a:tint val="50000"/>
-                <a:shade val="100000"/>
-                <a:satMod val="350000"/>
-              </a:schemeClr>
-            </a:gs>
-          </a:gsLst>
-          <a:lin ang="16200000" scaled="0"/>
-        </a:gradFill>
-      </a:fillStyleLst>
-      <a:lnStyleLst>
-        <a:ln w="9525" cap="flat" cmpd="sng" algn="ctr">
-          <a:solidFill>
-            <a:schemeClr val="phClr">
-              <a:shade val="95000"/>
-              <a:satMod val="105000"/>
-            </a:schemeClr>
-          </a:solidFill>
-          <a:prstDash val="solid"/>
-        </a:ln>
-        <a:ln w="25400" cap="flat" cmpd="sng" algn="ctr">
-          <a:solidFill>
-            <a:schemeClr val="phClr"/>
-          </a:solidFill>
-          <a:prstDash val="solid"/>
-        </a:ln>
-        <a:ln w="38100" cap="flat" cmpd="sng" algn="ctr">
-          <a:solidFill>
-            <a:schemeClr val="phClr"/>
-          </a:solidFill>
-          <a:prstDash val="solid"/>
-        </a:ln>
-      </a:lnStyleLst>
-      <a:effectStyleLst>
-        <a:effectStyle>
-          <a:effectLst>
-            <a:outerShdw blurRad="40000" dist="20000" dir="5400000" rotWithShape="0">
-              <a:srgbClr val="000000">
-                <a:alpha val="38000"/>
-              </a:srgbClr>
-            </a:outerShdw>
-          </a:effectLst>
-        </a:effectStyle>
-        <a:effectStyle>
-          <a:effectLst>
-            <a:outerShdw blurRad="40000" dist="23000" dir="5400000" rotWithShape="0">
-              <a:srgbClr val="000000">
-                <a:alpha val="35000"/>
-              </a:srgbClr>
-            </a:outerShdw>
-          </a:effectLst>
-        </a:effectStyle>
-        <a:effectStyle>
-          <a:effectLst>
-            <a:outerShdw blurRad="40000" dist="23000" dir="5400000" rotWithShape="0">
-              <a:srgbClr val="000000">
-                <a:alpha val="35000"/>
-              </a:srgbClr>
-            </a:outerShdw>
-          </a:effectLst>
-          <a:scene3d>
-            <a:camera prst="orthographicFront">
-              <a:rot lat="0" lon="0" rev="0"/>
-            </a:camera>
-            <a:lightRig rig="threePt" dir="t">
-              <a:rot lat="0" lon="0" rev="1200000"/>
-            </a:lightRig>
-          </a:scene3d>
-          <a:sp3d>
-            <a:bevelT w="63500" h="25400"/>
-          </a:sp3d>
-        </a:effectStyle>
-      </a:effectStyleLst>
-      <a:bgFillStyleLst>
-        <a:solidFill>
-          <a:schemeClr val="phClr"/>
-        </a:solidFill>
-        <a:gradFill rotWithShape="1">
-          <a:gsLst>
-            <a:gs pos="0">
-              <a:schemeClr val="phClr">
-                <a:tint val="40000"/>
-                <a:satMod val="350000"/>
-              </a:schemeClr>
-            </a:gs>
-            <a:gs pos="40000">
-              <a:schemeClr val="phClr">
-                <a:tint val="45000"/>
-                <a:shade val="99000"/>
-                <a:satMod val="350000"/>
-              </a:schemeClr>
-            </a:gs>
-            <a:gs pos="100000">
-              <a:schemeClr val="phClr">
-                <a:shade val="20000"/>
-                <a:satMod val="255000"/>
-              </a:schemeClr>
-            </a:gs>
-          </a:gsLst>
-          <a:path path="circle">
-            <a:fillToRect l="50000" t="-80000" r="50000" b="180000"/>
-          </a:path>
-        </a:gradFill>
-        <a:gradFill rotWithShape="1">
-          <a:gsLst>
-            <a:gs pos="0">
-              <a:schemeClr val="phClr">
-                <a:tint val="80000"/>
-                <a:satMod val="300000"/>
-              </a:schemeClr>
-            </a:gs>
-            <a:gs pos="100000">
-              <a:schemeClr val="phClr">
-                <a:shade val="30000"/>
-                <a:satMod val="200000"/>
-              </a:schemeClr>
-            </a:gs>
-          </a:gsLst>
-          <a:path path="circle">
-            <a:fillToRect l="50000" t="50000" r="50000" b="50000"/>
-          </a:path>
-        </a:gradFill>
-      </a:bgFillStyleLst>
-    </a:fmtScheme>
-  </a:themeElements>
-</a:theme>
 </file>
</xml_diff>